<commit_message>
adding tweaked collections PPT
</commit_message>
<xml_diff>
--- a/slide_decks/02_collections_in_python.pptx
+++ b/slide_decks/02_collections_in_python.pptx
@@ -4572,7 +4572,7 @@
         </p:spPr>
         <p:txBody>
           <a:bodyPr>
-            <a:normAutofit fontScale="70000" lnSpcReduction="20000"/>
+            <a:normAutofit fontScale="47500" lnSpcReduction="20000"/>
           </a:bodyPr>
           <a:lstStyle/>
           <a:p>
@@ -4737,8 +4737,89 @@
               <a:rPr lang="en-US" sz="3300" dirty="0" smtClean="0">
                 <a:latin typeface="Consolas" pitchFamily="49" charset="0"/>
               </a:rPr>
-              <a:t>(letters)-1:-1])</a:t>
-            </a:r>
+              <a:t>(letters)-1:-1</a:t>
+            </a:r>
+            <a:r>
+              <a:rPr lang="en-US" sz="3300" dirty="0" smtClean="0">
+                <a:latin typeface="Consolas" pitchFamily="49" charset="0"/>
+              </a:rPr>
+              <a:t>])</a:t>
+            </a:r>
+          </a:p>
+          <a:p>
+            <a:pPr>
+              <a:buNone/>
+            </a:pPr>
+            <a:r>
+              <a:rPr lang="en-US" sz="3300" dirty="0" smtClean="0">
+                <a:latin typeface="Consolas" pitchFamily="49" charset="0"/>
+              </a:rPr>
+              <a:t>…</a:t>
+            </a:r>
+          </a:p>
+          <a:p>
+            <a:pPr>
+              <a:buNone/>
+            </a:pPr>
+            <a:r>
+              <a:rPr lang="en-US" sz="3300" dirty="0" smtClean="0">
+                <a:latin typeface="Consolas" pitchFamily="49" charset="0"/>
+              </a:rPr>
+              <a:t>34</a:t>
+            </a:r>
+          </a:p>
+          <a:p>
+            <a:pPr>
+              <a:buNone/>
+            </a:pPr>
+            <a:r>
+              <a:rPr lang="en-US" sz="3300" dirty="0" smtClean="0">
+                <a:latin typeface="Consolas" pitchFamily="49" charset="0"/>
+              </a:rPr>
+              <a:t>['a', 'b', 's', 'h', 'g', 'H', 'J', 'S', 'c', 'z', 'm', ',', 'k', 'u', 'w', 'y', 'e']</a:t>
+            </a:r>
+          </a:p>
+          <a:p>
+            <a:pPr>
+              <a:buNone/>
+            </a:pPr>
+            <a:r>
+              <a:rPr lang="en-US" sz="3300" dirty="0" smtClean="0">
+                <a:latin typeface="Consolas" pitchFamily="49" charset="0"/>
+              </a:rPr>
+              <a:t>{'a': 3, 'b': 2, 's': 6, 'h': 3, 'g': 2, 'H': 2, 'J': 4, 'S': 2, 'c': 1, 'z': 2, 'm': 1, ',': 1, 'k': 1, 'u': 1, 'w': 1, 'y': 1, 'e': 1}</a:t>
+            </a:r>
+          </a:p>
+          <a:p>
+            <a:pPr>
+              <a:buNone/>
+            </a:pPr>
+            <a:r>
+              <a:rPr lang="en-US" sz="3300" dirty="0" err="1" smtClean="0">
+                <a:latin typeface="Consolas" pitchFamily="49" charset="0"/>
+              </a:rPr>
+              <a:t>dict_items</a:t>
+            </a:r>
+            <a:r>
+              <a:rPr lang="en-US" sz="3300" dirty="0" smtClean="0">
+                <a:latin typeface="Consolas" pitchFamily="49" charset="0"/>
+              </a:rPr>
+              <a:t>([('a', 3), ('b', 2), ('s', 6), ('h', 3), ('g', 2), ('H', 2), ('J', 4), ('S', 2), ('c', 1), ('z', 2), ('m', 1), (',', 1), ('k', 1), ('u', 1), ('w', 1), ('y', 1), ('e', 1)])</a:t>
+            </a:r>
+          </a:p>
+          <a:p>
+            <a:pPr>
+              <a:buNone/>
+            </a:pPr>
+            <a:r>
+              <a:rPr lang="en-US" sz="3300" dirty="0" smtClean="0">
+                <a:latin typeface="Consolas" pitchFamily="49" charset="0"/>
+              </a:rPr>
+              <a:t>[('e', 1), ('y', 1), ('w', 1), ('u', 1), ('k', 1), (',', 1), ('m', 1), ('c', 1), ('z', 2), ('S', 2), ('H', 2</a:t>
+            </a:r>
+            <a:endParaRPr lang="en-US" sz="3300" dirty="0" smtClean="0">
+              <a:latin typeface="Consolas" pitchFamily="49" charset="0"/>
+            </a:endParaRPr>
           </a:p>
           <a:p>
             <a:pPr>
@@ -8702,11 +8783,7 @@
           <a:p>
             <a:r>
               <a:rPr lang="en-US" dirty="0" smtClean="0"/>
-              <a:t>Download here</a:t>
-            </a:r>
-            <a:r>
-              <a:rPr lang="en-US" dirty="0" smtClean="0"/>
-              <a:t>: </a:t>
+              <a:t>Download here: </a:t>
             </a:r>
             <a:r>
               <a:rPr lang="en-US" sz="2000" dirty="0" smtClean="0">
@@ -9375,11 +9452,15 @@
               <a:t> doesn’t have. Example, </a:t>
             </a:r>
             <a:r>
-              <a:rPr lang="en-US" dirty="0" err="1" smtClean="0"/>
+              <a:rPr lang="en-US" dirty="0" err="1" smtClean="0">
+                <a:latin typeface="Consolas" pitchFamily="49" charset="0"/>
+              </a:rPr>
               <a:t>most_common</a:t>
             </a:r>
             <a:r>
-              <a:rPr lang="en-US" dirty="0" smtClean="0"/>
+              <a:rPr lang="en-US" dirty="0" smtClean="0">
+                <a:latin typeface="Consolas" pitchFamily="49" charset="0"/>
+              </a:rPr>
               <a:t>(), subtract()</a:t>
             </a:r>
           </a:p>

</xml_diff>